<commit_message>
finished basic CSS, at least it looks presentable now. will add music and animation next if I can
</commit_message>
<xml_diff>
--- a/video poker layout.pptx
+++ b/video poker layout.pptx
@@ -105,6 +105,11 @@
       </a:defRPr>
     </a:lvl9pPr>
   </p:defaultTextStyle>
+  <p:extLst>
+    <p:ext uri="{EFAFB233-063F-42B5-8137-9DF3F51BA10A}">
+      <p15:sldGuideLst xmlns:p15="http://schemas.microsoft.com/office/powerpoint/2012/main"/>
+    </p:ext>
+  </p:extLst>
 </p:presentation>
 </file>
 
@@ -257,7 +262,7 @@
           <a:p>
             <a:fld id="{3F0578C2-A835-491F-9814-6A8D208FF16C}" type="datetimeFigureOut">
               <a:rPr lang="en-SG" smtClean="0"/>
-              <a:t>9/12/2021</a:t>
+              <a:t>16/12/2021</a:t>
             </a:fld>
             <a:endParaRPr lang="en-SG"/>
           </a:p>
@@ -457,7 +462,7 @@
           <a:p>
             <a:fld id="{3F0578C2-A835-491F-9814-6A8D208FF16C}" type="datetimeFigureOut">
               <a:rPr lang="en-SG" smtClean="0"/>
-              <a:t>9/12/2021</a:t>
+              <a:t>16/12/2021</a:t>
             </a:fld>
             <a:endParaRPr lang="en-SG"/>
           </a:p>
@@ -667,7 +672,7 @@
           <a:p>
             <a:fld id="{3F0578C2-A835-491F-9814-6A8D208FF16C}" type="datetimeFigureOut">
               <a:rPr lang="en-SG" smtClean="0"/>
-              <a:t>9/12/2021</a:t>
+              <a:t>16/12/2021</a:t>
             </a:fld>
             <a:endParaRPr lang="en-SG"/>
           </a:p>
@@ -867,7 +872,7 @@
           <a:p>
             <a:fld id="{3F0578C2-A835-491F-9814-6A8D208FF16C}" type="datetimeFigureOut">
               <a:rPr lang="en-SG" smtClean="0"/>
-              <a:t>9/12/2021</a:t>
+              <a:t>16/12/2021</a:t>
             </a:fld>
             <a:endParaRPr lang="en-SG"/>
           </a:p>
@@ -1143,7 +1148,7 @@
           <a:p>
             <a:fld id="{3F0578C2-A835-491F-9814-6A8D208FF16C}" type="datetimeFigureOut">
               <a:rPr lang="en-SG" smtClean="0"/>
-              <a:t>9/12/2021</a:t>
+              <a:t>16/12/2021</a:t>
             </a:fld>
             <a:endParaRPr lang="en-SG"/>
           </a:p>
@@ -1411,7 +1416,7 @@
           <a:p>
             <a:fld id="{3F0578C2-A835-491F-9814-6A8D208FF16C}" type="datetimeFigureOut">
               <a:rPr lang="en-SG" smtClean="0"/>
-              <a:t>9/12/2021</a:t>
+              <a:t>16/12/2021</a:t>
             </a:fld>
             <a:endParaRPr lang="en-SG"/>
           </a:p>
@@ -1826,7 +1831,7 @@
           <a:p>
             <a:fld id="{3F0578C2-A835-491F-9814-6A8D208FF16C}" type="datetimeFigureOut">
               <a:rPr lang="en-SG" smtClean="0"/>
-              <a:t>9/12/2021</a:t>
+              <a:t>16/12/2021</a:t>
             </a:fld>
             <a:endParaRPr lang="en-SG"/>
           </a:p>
@@ -1968,7 +1973,7 @@
           <a:p>
             <a:fld id="{3F0578C2-A835-491F-9814-6A8D208FF16C}" type="datetimeFigureOut">
               <a:rPr lang="en-SG" smtClean="0"/>
-              <a:t>9/12/2021</a:t>
+              <a:t>16/12/2021</a:t>
             </a:fld>
             <a:endParaRPr lang="en-SG"/>
           </a:p>
@@ -2081,7 +2086,7 @@
           <a:p>
             <a:fld id="{3F0578C2-A835-491F-9814-6A8D208FF16C}" type="datetimeFigureOut">
               <a:rPr lang="en-SG" smtClean="0"/>
-              <a:t>9/12/2021</a:t>
+              <a:t>16/12/2021</a:t>
             </a:fld>
             <a:endParaRPr lang="en-SG"/>
           </a:p>
@@ -2394,7 +2399,7 @@
           <a:p>
             <a:fld id="{3F0578C2-A835-491F-9814-6A8D208FF16C}" type="datetimeFigureOut">
               <a:rPr lang="en-SG" smtClean="0"/>
-              <a:t>9/12/2021</a:t>
+              <a:t>16/12/2021</a:t>
             </a:fld>
             <a:endParaRPr lang="en-SG"/>
           </a:p>
@@ -2683,7 +2688,7 @@
           <a:p>
             <a:fld id="{3F0578C2-A835-491F-9814-6A8D208FF16C}" type="datetimeFigureOut">
               <a:rPr lang="en-SG" smtClean="0"/>
-              <a:t>9/12/2021</a:t>
+              <a:t>16/12/2021</a:t>
             </a:fld>
             <a:endParaRPr lang="en-SG"/>
           </a:p>
@@ -2926,7 +2931,7 @@
           <a:p>
             <a:fld id="{3F0578C2-A835-491F-9814-6A8D208FF16C}" type="datetimeFigureOut">
               <a:rPr lang="en-SG" smtClean="0"/>
-              <a:t>9/12/2021</a:t>
+              <a:t>16/12/2021</a:t>
             </a:fld>
             <a:endParaRPr lang="en-SG"/>
           </a:p>
@@ -3394,7 +3399,7 @@
           <a:p>
             <a:r>
               <a:rPr lang="en-SG" dirty="0"/>
-              <a:t>9 Dec 21</a:t>
+              <a:t>16 Dec 21</a:t>
             </a:r>
           </a:p>
         </p:txBody>
@@ -3444,7 +3449,7 @@
         <p:spPr>
           <a:xfrm>
             <a:off x="3394073" y="1853604"/>
-            <a:ext cx="7830103" cy="3024593"/>
+            <a:ext cx="7830103" cy="3150792"/>
           </a:xfrm>
           <a:prstGeom prst="rect">
             <a:avLst/>
@@ -3498,7 +3503,7 @@
         <p:spPr>
           <a:xfrm>
             <a:off x="3766934" y="2197769"/>
-            <a:ext cx="7167237" cy="2351954"/>
+            <a:ext cx="7167237" cy="2454442"/>
           </a:xfrm>
           <a:prstGeom prst="rect">
             <a:avLst/>
@@ -3554,7 +3559,7 @@
           <p:nvPr>
             <p:extLst>
               <p:ext uri="{D42A27DB-BD31-4B8C-83A1-F6EECF244321}">
-                <p14:modId xmlns:p14="http://schemas.microsoft.com/office/powerpoint/2010/main" val="2994146742"/>
+                <p14:modId xmlns:p14="http://schemas.microsoft.com/office/powerpoint/2010/main" val="3592465278"/>
               </p:ext>
             </p:extLst>
           </p:nvPr>
@@ -3597,7 +3602,26 @@
                       </a:r>
                     </a:p>
                   </a:txBody>
-                  <a:tcPr/>
+                  <a:tcPr>
+                    <a:lnL w="12700" cap="flat" cmpd="sng" algn="ctr">
+                      <a:solidFill>
+                        <a:schemeClr val="tx1"/>
+                      </a:solidFill>
+                      <a:prstDash val="solid"/>
+                      <a:round/>
+                      <a:headEnd type="none" w="med" len="med"/>
+                      <a:tailEnd type="none" w="med" len="med"/>
+                    </a:lnL>
+                    <a:lnT w="12700" cap="flat" cmpd="sng" algn="ctr">
+                      <a:solidFill>
+                        <a:schemeClr val="tx1"/>
+                      </a:solidFill>
+                      <a:prstDash val="solid"/>
+                      <a:round/>
+                      <a:headEnd type="none" w="med" len="med"/>
+                      <a:tailEnd type="none" w="med" len="med"/>
+                    </a:lnT>
+                  </a:tcPr>
                 </a:tc>
                 <a:tc>
                   <a:txBody>
@@ -3610,7 +3634,26 @@
                       </a:r>
                     </a:p>
                   </a:txBody>
-                  <a:tcPr/>
+                  <a:tcPr>
+                    <a:lnR w="12700" cap="flat" cmpd="sng" algn="ctr">
+                      <a:solidFill>
+                        <a:schemeClr val="tx1"/>
+                      </a:solidFill>
+                      <a:prstDash val="solid"/>
+                      <a:round/>
+                      <a:headEnd type="none" w="med" len="med"/>
+                      <a:tailEnd type="none" w="med" len="med"/>
+                    </a:lnR>
+                    <a:lnT w="12700" cap="flat" cmpd="sng" algn="ctr">
+                      <a:solidFill>
+                        <a:schemeClr val="tx1"/>
+                      </a:solidFill>
+                      <a:prstDash val="solid"/>
+                      <a:round/>
+                      <a:headEnd type="none" w="med" len="med"/>
+                      <a:tailEnd type="none" w="med" len="med"/>
+                    </a:lnT>
+                  </a:tcPr>
                 </a:tc>
                 <a:extLst>
                   <a:ext uri="{0D108BD9-81ED-4DB2-BD59-A6C34878D82A}">
@@ -3630,7 +3673,17 @@
                       </a:r>
                     </a:p>
                   </a:txBody>
-                  <a:tcPr/>
+                  <a:tcPr>
+                    <a:lnL w="12700" cap="flat" cmpd="sng" algn="ctr">
+                      <a:solidFill>
+                        <a:schemeClr val="tx1"/>
+                      </a:solidFill>
+                      <a:prstDash val="solid"/>
+                      <a:round/>
+                      <a:headEnd type="none" w="med" len="med"/>
+                      <a:tailEnd type="none" w="med" len="med"/>
+                    </a:lnL>
+                  </a:tcPr>
                 </a:tc>
                 <a:tc>
                   <a:txBody>
@@ -3643,7 +3696,17 @@
                       </a:r>
                     </a:p>
                   </a:txBody>
-                  <a:tcPr/>
+                  <a:tcPr>
+                    <a:lnR w="12700" cap="flat" cmpd="sng" algn="ctr">
+                      <a:solidFill>
+                        <a:schemeClr val="tx1"/>
+                      </a:solidFill>
+                      <a:prstDash val="solid"/>
+                      <a:round/>
+                      <a:headEnd type="none" w="med" len="med"/>
+                      <a:tailEnd type="none" w="med" len="med"/>
+                    </a:lnR>
+                  </a:tcPr>
                 </a:tc>
                 <a:extLst>
                   <a:ext uri="{0D108BD9-81ED-4DB2-BD59-A6C34878D82A}">
@@ -3663,7 +3726,17 @@
                       </a:r>
                     </a:p>
                   </a:txBody>
-                  <a:tcPr/>
+                  <a:tcPr>
+                    <a:lnL w="12700" cap="flat" cmpd="sng" algn="ctr">
+                      <a:solidFill>
+                        <a:schemeClr val="tx1"/>
+                      </a:solidFill>
+                      <a:prstDash val="solid"/>
+                      <a:round/>
+                      <a:headEnd type="none" w="med" len="med"/>
+                      <a:tailEnd type="none" w="med" len="med"/>
+                    </a:lnL>
+                  </a:tcPr>
                 </a:tc>
                 <a:tc>
                   <a:txBody>
@@ -3676,7 +3749,17 @@
                       </a:r>
                     </a:p>
                   </a:txBody>
-                  <a:tcPr/>
+                  <a:tcPr>
+                    <a:lnR w="12700" cap="flat" cmpd="sng" algn="ctr">
+                      <a:solidFill>
+                        <a:schemeClr val="tx1"/>
+                      </a:solidFill>
+                      <a:prstDash val="solid"/>
+                      <a:round/>
+                      <a:headEnd type="none" w="med" len="med"/>
+                      <a:tailEnd type="none" w="med" len="med"/>
+                    </a:lnR>
+                  </a:tcPr>
                 </a:tc>
                 <a:extLst>
                   <a:ext uri="{0D108BD9-81ED-4DB2-BD59-A6C34878D82A}">
@@ -3696,7 +3779,17 @@
                       </a:r>
                     </a:p>
                   </a:txBody>
-                  <a:tcPr/>
+                  <a:tcPr>
+                    <a:lnL w="12700" cap="flat" cmpd="sng" algn="ctr">
+                      <a:solidFill>
+                        <a:schemeClr val="tx1"/>
+                      </a:solidFill>
+                      <a:prstDash val="solid"/>
+                      <a:round/>
+                      <a:headEnd type="none" w="med" len="med"/>
+                      <a:tailEnd type="none" w="med" len="med"/>
+                    </a:lnL>
+                  </a:tcPr>
                 </a:tc>
                 <a:tc>
                   <a:txBody>
@@ -3709,7 +3802,17 @@
                       </a:r>
                     </a:p>
                   </a:txBody>
-                  <a:tcPr/>
+                  <a:tcPr>
+                    <a:lnR w="12700" cap="flat" cmpd="sng" algn="ctr">
+                      <a:solidFill>
+                        <a:schemeClr val="tx1"/>
+                      </a:solidFill>
+                      <a:prstDash val="solid"/>
+                      <a:round/>
+                      <a:headEnd type="none" w="med" len="med"/>
+                      <a:tailEnd type="none" w="med" len="med"/>
+                    </a:lnR>
+                  </a:tcPr>
                 </a:tc>
                 <a:extLst>
                   <a:ext uri="{0D108BD9-81ED-4DB2-BD59-A6C34878D82A}">
@@ -3729,7 +3832,17 @@
                       </a:r>
                     </a:p>
                   </a:txBody>
-                  <a:tcPr/>
+                  <a:tcPr>
+                    <a:lnL w="12700" cap="flat" cmpd="sng" algn="ctr">
+                      <a:solidFill>
+                        <a:schemeClr val="tx1"/>
+                      </a:solidFill>
+                      <a:prstDash val="solid"/>
+                      <a:round/>
+                      <a:headEnd type="none" w="med" len="med"/>
+                      <a:tailEnd type="none" w="med" len="med"/>
+                    </a:lnL>
+                  </a:tcPr>
                 </a:tc>
                 <a:tc>
                   <a:txBody>
@@ -3742,7 +3855,17 @@
                       </a:r>
                     </a:p>
                   </a:txBody>
-                  <a:tcPr/>
+                  <a:tcPr>
+                    <a:lnR w="12700" cap="flat" cmpd="sng" algn="ctr">
+                      <a:solidFill>
+                        <a:schemeClr val="tx1"/>
+                      </a:solidFill>
+                      <a:prstDash val="solid"/>
+                      <a:round/>
+                      <a:headEnd type="none" w="med" len="med"/>
+                      <a:tailEnd type="none" w="med" len="med"/>
+                    </a:lnR>
+                  </a:tcPr>
                 </a:tc>
                 <a:extLst>
                   <a:ext uri="{0D108BD9-81ED-4DB2-BD59-A6C34878D82A}">
@@ -3762,7 +3885,17 @@
                       </a:r>
                     </a:p>
                   </a:txBody>
-                  <a:tcPr/>
+                  <a:tcPr>
+                    <a:lnL w="12700" cap="flat" cmpd="sng" algn="ctr">
+                      <a:solidFill>
+                        <a:schemeClr val="tx1"/>
+                      </a:solidFill>
+                      <a:prstDash val="solid"/>
+                      <a:round/>
+                      <a:headEnd type="none" w="med" len="med"/>
+                      <a:tailEnd type="none" w="med" len="med"/>
+                    </a:lnL>
+                  </a:tcPr>
                 </a:tc>
                 <a:tc>
                   <a:txBody>
@@ -3775,7 +3908,17 @@
                       </a:r>
                     </a:p>
                   </a:txBody>
-                  <a:tcPr/>
+                  <a:tcPr>
+                    <a:lnR w="12700" cap="flat" cmpd="sng" algn="ctr">
+                      <a:solidFill>
+                        <a:schemeClr val="tx1"/>
+                      </a:solidFill>
+                      <a:prstDash val="solid"/>
+                      <a:round/>
+                      <a:headEnd type="none" w="med" len="med"/>
+                      <a:tailEnd type="none" w="med" len="med"/>
+                    </a:lnR>
+                  </a:tcPr>
                 </a:tc>
                 <a:extLst>
                   <a:ext uri="{0D108BD9-81ED-4DB2-BD59-A6C34878D82A}">
@@ -3795,7 +3938,17 @@
                       </a:r>
                     </a:p>
                   </a:txBody>
-                  <a:tcPr/>
+                  <a:tcPr>
+                    <a:lnL w="12700" cap="flat" cmpd="sng" algn="ctr">
+                      <a:solidFill>
+                        <a:schemeClr val="tx1"/>
+                      </a:solidFill>
+                      <a:prstDash val="solid"/>
+                      <a:round/>
+                      <a:headEnd type="none" w="med" len="med"/>
+                      <a:tailEnd type="none" w="med" len="med"/>
+                    </a:lnL>
+                  </a:tcPr>
                 </a:tc>
                 <a:tc>
                   <a:txBody>
@@ -3808,7 +3961,17 @@
                       </a:r>
                     </a:p>
                   </a:txBody>
-                  <a:tcPr/>
+                  <a:tcPr>
+                    <a:lnR w="12700" cap="flat" cmpd="sng" algn="ctr">
+                      <a:solidFill>
+                        <a:schemeClr val="tx1"/>
+                      </a:solidFill>
+                      <a:prstDash val="solid"/>
+                      <a:round/>
+                      <a:headEnd type="none" w="med" len="med"/>
+                      <a:tailEnd type="none" w="med" len="med"/>
+                    </a:lnR>
+                  </a:tcPr>
                 </a:tc>
                 <a:extLst>
                   <a:ext uri="{0D108BD9-81ED-4DB2-BD59-A6C34878D82A}">
@@ -3828,7 +3991,17 @@
                       </a:r>
                     </a:p>
                   </a:txBody>
-                  <a:tcPr/>
+                  <a:tcPr>
+                    <a:lnL w="12700" cap="flat" cmpd="sng" algn="ctr">
+                      <a:solidFill>
+                        <a:schemeClr val="tx1"/>
+                      </a:solidFill>
+                      <a:prstDash val="solid"/>
+                      <a:round/>
+                      <a:headEnd type="none" w="med" len="med"/>
+                      <a:tailEnd type="none" w="med" len="med"/>
+                    </a:lnL>
+                  </a:tcPr>
                 </a:tc>
                 <a:tc>
                   <a:txBody>
@@ -3841,7 +4014,17 @@
                       </a:r>
                     </a:p>
                   </a:txBody>
-                  <a:tcPr/>
+                  <a:tcPr>
+                    <a:lnR w="12700" cap="flat" cmpd="sng" algn="ctr">
+                      <a:solidFill>
+                        <a:schemeClr val="tx1"/>
+                      </a:solidFill>
+                      <a:prstDash val="solid"/>
+                      <a:round/>
+                      <a:headEnd type="none" w="med" len="med"/>
+                      <a:tailEnd type="none" w="med" len="med"/>
+                    </a:lnR>
+                  </a:tcPr>
                 </a:tc>
                 <a:extLst>
                   <a:ext uri="{0D108BD9-81ED-4DB2-BD59-A6C34878D82A}">
@@ -3861,7 +4044,17 @@
                       </a:r>
                     </a:p>
                   </a:txBody>
-                  <a:tcPr/>
+                  <a:tcPr>
+                    <a:lnL w="12700" cap="flat" cmpd="sng" algn="ctr">
+                      <a:solidFill>
+                        <a:schemeClr val="tx1"/>
+                      </a:solidFill>
+                      <a:prstDash val="solid"/>
+                      <a:round/>
+                      <a:headEnd type="none" w="med" len="med"/>
+                      <a:tailEnd type="none" w="med" len="med"/>
+                    </a:lnL>
+                  </a:tcPr>
                 </a:tc>
                 <a:tc>
                   <a:txBody>
@@ -3874,7 +4067,17 @@
                       </a:r>
                     </a:p>
                   </a:txBody>
-                  <a:tcPr/>
+                  <a:tcPr>
+                    <a:lnR w="12700" cap="flat" cmpd="sng" algn="ctr">
+                      <a:solidFill>
+                        <a:schemeClr val="tx1"/>
+                      </a:solidFill>
+                      <a:prstDash val="solid"/>
+                      <a:round/>
+                      <a:headEnd type="none" w="med" len="med"/>
+                      <a:tailEnd type="none" w="med" len="med"/>
+                    </a:lnR>
+                  </a:tcPr>
                 </a:tc>
                 <a:extLst>
                   <a:ext uri="{0D108BD9-81ED-4DB2-BD59-A6C34878D82A}">
@@ -3894,7 +4097,26 @@
                       </a:r>
                     </a:p>
                   </a:txBody>
-                  <a:tcPr/>
+                  <a:tcPr>
+                    <a:lnL w="12700" cap="flat" cmpd="sng" algn="ctr">
+                      <a:solidFill>
+                        <a:schemeClr val="tx1"/>
+                      </a:solidFill>
+                      <a:prstDash val="solid"/>
+                      <a:round/>
+                      <a:headEnd type="none" w="med" len="med"/>
+                      <a:tailEnd type="none" w="med" len="med"/>
+                    </a:lnL>
+                    <a:lnB w="12700" cap="flat" cmpd="sng" algn="ctr">
+                      <a:solidFill>
+                        <a:schemeClr val="tx1"/>
+                      </a:solidFill>
+                      <a:prstDash val="solid"/>
+                      <a:round/>
+                      <a:headEnd type="none" w="med" len="med"/>
+                      <a:tailEnd type="none" w="med" len="med"/>
+                    </a:lnB>
+                  </a:tcPr>
                 </a:tc>
                 <a:tc>
                   <a:txBody>
@@ -3907,7 +4129,26 @@
                       </a:r>
                     </a:p>
                   </a:txBody>
-                  <a:tcPr/>
+                  <a:tcPr>
+                    <a:lnR w="12700" cap="flat" cmpd="sng" algn="ctr">
+                      <a:solidFill>
+                        <a:schemeClr val="tx1"/>
+                      </a:solidFill>
+                      <a:prstDash val="solid"/>
+                      <a:round/>
+                      <a:headEnd type="none" w="med" len="med"/>
+                      <a:tailEnd type="none" w="med" len="med"/>
+                    </a:lnR>
+                    <a:lnB w="12700" cap="flat" cmpd="sng" algn="ctr">
+                      <a:solidFill>
+                        <a:schemeClr val="tx1"/>
+                      </a:solidFill>
+                      <a:prstDash val="solid"/>
+                      <a:round/>
+                      <a:headEnd type="none" w="med" len="med"/>
+                      <a:tailEnd type="none" w="med" len="med"/>
+                    </a:lnB>
+                  </a:tcPr>
                 </a:tc>
                 <a:extLst>
                   <a:ext uri="{0D108BD9-81ED-4DB2-BD59-A6C34878D82A}">
@@ -3933,8 +4174,237 @@
         </p:nvSpPr>
         <p:spPr>
           <a:xfrm>
-            <a:off x="3394073" y="5332929"/>
-            <a:ext cx="2374960" cy="465221"/>
+            <a:off x="6764882" y="5332927"/>
+            <a:ext cx="1957865" cy="465221"/>
+          </a:xfrm>
+          <a:prstGeom prst="rect">
+            <a:avLst/>
+          </a:prstGeom>
+          <a:solidFill>
+            <a:schemeClr val="bg1"/>
+          </a:solidFill>
+          <a:ln>
+            <a:solidFill>
+              <a:schemeClr val="tx1"/>
+            </a:solidFill>
+            <a:prstDash val="dash"/>
+          </a:ln>
+        </p:spPr>
+        <p:style>
+          <a:lnRef idx="2">
+            <a:schemeClr val="accent1">
+              <a:shade val="50000"/>
+            </a:schemeClr>
+          </a:lnRef>
+          <a:fillRef idx="1">
+            <a:schemeClr val="accent1"/>
+          </a:fillRef>
+          <a:effectRef idx="0">
+            <a:schemeClr val="accent1"/>
+          </a:effectRef>
+          <a:fontRef idx="minor">
+            <a:schemeClr val="lt1"/>
+          </a:fontRef>
+        </p:style>
+        <p:txBody>
+          <a:bodyPr rtlCol="0" anchor="ctr"/>
+          <a:lstStyle/>
+          <a:p>
+            <a:pPr algn="ctr"/>
+            <a:r>
+              <a:rPr lang="en-SG" dirty="0">
+                <a:solidFill>
+                  <a:sysClr val="windowText" lastClr="000000"/>
+                </a:solidFill>
+              </a:rPr>
+              <a:t>Bet Input Field</a:t>
+            </a:r>
+          </a:p>
+        </p:txBody>
+      </p:sp>
+      <p:sp>
+        <p:nvSpPr>
+          <p:cNvPr id="9" name="Rectangle 8">
+            <a:extLst>
+              <a:ext uri="{FF2B5EF4-FFF2-40B4-BE49-F238E27FC236}">
+                <a16:creationId xmlns:a16="http://schemas.microsoft.com/office/drawing/2014/main" id="{8D98C222-B9F3-4BF9-B4DE-5C640E10DB1F}"/>
+              </a:ext>
+            </a:extLst>
+          </p:cNvPr>
+          <p:cNvSpPr/>
+          <p:nvPr/>
+        </p:nvSpPr>
+        <p:spPr>
+          <a:xfrm>
+            <a:off x="8849217" y="5332927"/>
+            <a:ext cx="2374959" cy="465221"/>
+          </a:xfrm>
+          <a:prstGeom prst="rect">
+            <a:avLst/>
+          </a:prstGeom>
+        </p:spPr>
+        <p:style>
+          <a:lnRef idx="2">
+            <a:schemeClr val="accent1">
+              <a:shade val="50000"/>
+            </a:schemeClr>
+          </a:lnRef>
+          <a:fillRef idx="1">
+            <a:schemeClr val="accent1"/>
+          </a:fillRef>
+          <a:effectRef idx="0">
+            <a:schemeClr val="accent1"/>
+          </a:effectRef>
+          <a:fontRef idx="minor">
+            <a:schemeClr val="lt1"/>
+          </a:fontRef>
+        </p:style>
+        <p:txBody>
+          <a:bodyPr rtlCol="0" anchor="ctr"/>
+          <a:lstStyle/>
+          <a:p>
+            <a:pPr algn="ctr"/>
+            <a:r>
+              <a:rPr lang="en-SG" dirty="0"/>
+              <a:t>Submit / Deal Cards</a:t>
+            </a:r>
+          </a:p>
+        </p:txBody>
+      </p:sp>
+      <p:sp>
+        <p:nvSpPr>
+          <p:cNvPr id="12" name="Rectangle 11">
+            <a:extLst>
+              <a:ext uri="{FF2B5EF4-FFF2-40B4-BE49-F238E27FC236}">
+                <a16:creationId xmlns:a16="http://schemas.microsoft.com/office/drawing/2014/main" id="{32BA0ABE-DC2A-4909-B292-647C8BB6D36F}"/>
+              </a:ext>
+            </a:extLst>
+          </p:cNvPr>
+          <p:cNvSpPr/>
+          <p:nvPr/>
+        </p:nvSpPr>
+        <p:spPr>
+          <a:xfrm>
+            <a:off x="557784" y="128337"/>
+            <a:ext cx="10666392" cy="660935"/>
+          </a:xfrm>
+          <a:prstGeom prst="rect">
+            <a:avLst/>
+          </a:prstGeom>
+          <a:noFill/>
+          <a:ln>
+            <a:solidFill>
+              <a:schemeClr val="tx1"/>
+            </a:solidFill>
+          </a:ln>
+        </p:spPr>
+        <p:style>
+          <a:lnRef idx="2">
+            <a:schemeClr val="accent1">
+              <a:shade val="50000"/>
+            </a:schemeClr>
+          </a:lnRef>
+          <a:fillRef idx="1">
+            <a:schemeClr val="accent1"/>
+          </a:fillRef>
+          <a:effectRef idx="0">
+            <a:schemeClr val="accent1"/>
+          </a:effectRef>
+          <a:fontRef idx="minor">
+            <a:schemeClr val="lt1"/>
+          </a:fontRef>
+        </p:style>
+        <p:txBody>
+          <a:bodyPr rtlCol="0" anchor="ctr"/>
+          <a:lstStyle/>
+          <a:p>
+            <a:pPr algn="ctr"/>
+            <a:r>
+              <a:rPr lang="en-SG" sz="3200" dirty="0">
+                <a:solidFill>
+                  <a:sysClr val="windowText" lastClr="000000"/>
+                </a:solidFill>
+              </a:rPr>
+              <a:t>Video Poker Game</a:t>
+            </a:r>
+          </a:p>
+        </p:txBody>
+      </p:sp>
+      <p:sp>
+        <p:nvSpPr>
+          <p:cNvPr id="11" name="Rectangle 10">
+            <a:extLst>
+              <a:ext uri="{FF2B5EF4-FFF2-40B4-BE49-F238E27FC236}">
+                <a16:creationId xmlns:a16="http://schemas.microsoft.com/office/drawing/2014/main" id="{A6C1B1FC-9DF4-49AA-9E41-55B5687253BF}"/>
+              </a:ext>
+            </a:extLst>
+          </p:cNvPr>
+          <p:cNvSpPr/>
+          <p:nvPr/>
+        </p:nvSpPr>
+        <p:spPr>
+          <a:xfrm>
+            <a:off x="557784" y="1020586"/>
+            <a:ext cx="10666392" cy="660935"/>
+          </a:xfrm>
+          <a:prstGeom prst="rect">
+            <a:avLst/>
+          </a:prstGeom>
+          <a:noFill/>
+          <a:ln>
+            <a:solidFill>
+              <a:schemeClr val="tx1"/>
+            </a:solidFill>
+          </a:ln>
+        </p:spPr>
+        <p:style>
+          <a:lnRef idx="2">
+            <a:schemeClr val="accent1">
+              <a:shade val="50000"/>
+            </a:schemeClr>
+          </a:lnRef>
+          <a:fillRef idx="1">
+            <a:schemeClr val="accent1"/>
+          </a:fillRef>
+          <a:effectRef idx="0">
+            <a:schemeClr val="accent1"/>
+          </a:effectRef>
+          <a:fontRef idx="minor">
+            <a:schemeClr val="lt1"/>
+          </a:fontRef>
+        </p:style>
+        <p:txBody>
+          <a:bodyPr rtlCol="0" anchor="ctr"/>
+          <a:lstStyle/>
+          <a:p>
+            <a:pPr algn="ctr"/>
+            <a:r>
+              <a:rPr lang="en-SG" sz="3200" dirty="0">
+                <a:solidFill>
+                  <a:sysClr val="windowText" lastClr="000000"/>
+                </a:solidFill>
+              </a:rPr>
+              <a:t>Game Info</a:t>
+            </a:r>
+          </a:p>
+        </p:txBody>
+      </p:sp>
+      <p:sp>
+        <p:nvSpPr>
+          <p:cNvPr id="13" name="Rectangle 12">
+            <a:extLst>
+              <a:ext uri="{FF2B5EF4-FFF2-40B4-BE49-F238E27FC236}">
+                <a16:creationId xmlns:a16="http://schemas.microsoft.com/office/drawing/2014/main" id="{991DCC55-CEB7-4144-9E66-E8E39C2DBC7E}"/>
+              </a:ext>
+            </a:extLst>
+          </p:cNvPr>
+          <p:cNvSpPr/>
+          <p:nvPr/>
+        </p:nvSpPr>
+        <p:spPr>
+          <a:xfrm>
+            <a:off x="5161122" y="5332926"/>
+            <a:ext cx="1459715" cy="465221"/>
           </a:xfrm>
           <a:prstGeom prst="rect">
             <a:avLst/>
@@ -3975,17 +4445,17 @@
                   <a:sysClr val="windowText" lastClr="000000"/>
                 </a:solidFill>
               </a:rPr>
-              <a:t>Input Bet</a:t>
-            </a:r>
-          </a:p>
-        </p:txBody>
-      </p:sp>
-      <p:sp>
-        <p:nvSpPr>
-          <p:cNvPr id="9" name="Rectangle 8">
-            <a:extLst>
-              <a:ext uri="{FF2B5EF4-FFF2-40B4-BE49-F238E27FC236}">
-                <a16:creationId xmlns:a16="http://schemas.microsoft.com/office/drawing/2014/main" id="{8D98C222-B9F3-4BF9-B4DE-5C640E10DB1F}"/>
+              <a:t>Bet Amount:</a:t>
+            </a:r>
+          </a:p>
+        </p:txBody>
+      </p:sp>
+      <p:sp>
+        <p:nvSpPr>
+          <p:cNvPr id="14" name="Rectangle 13">
+            <a:extLst>
+              <a:ext uri="{FF2B5EF4-FFF2-40B4-BE49-F238E27FC236}">
+                <a16:creationId xmlns:a16="http://schemas.microsoft.com/office/drawing/2014/main" id="{039C708B-4606-4502-8C97-5B906C9D37FF}"/>
               </a:ext>
             </a:extLst>
           </p:cNvPr>
@@ -3994,111 +4464,15 @@
         </p:nvSpPr>
         <p:spPr>
           <a:xfrm>
-            <a:off x="6576298" y="5332929"/>
-            <a:ext cx="2374959" cy="465221"/>
+            <a:off x="557784" y="5332925"/>
+            <a:ext cx="1459715" cy="465221"/>
           </a:xfrm>
           <a:prstGeom prst="rect">
             <a:avLst/>
           </a:prstGeom>
-        </p:spPr>
-        <p:style>
-          <a:lnRef idx="2">
-            <a:schemeClr val="accent1">
-              <a:shade val="50000"/>
-            </a:schemeClr>
-          </a:lnRef>
-          <a:fillRef idx="1">
-            <a:schemeClr val="accent1"/>
-          </a:fillRef>
-          <a:effectRef idx="0">
-            <a:schemeClr val="accent1"/>
-          </a:effectRef>
-          <a:fontRef idx="minor">
-            <a:schemeClr val="lt1"/>
-          </a:fontRef>
-        </p:style>
-        <p:txBody>
-          <a:bodyPr rtlCol="0" anchor="ctr"/>
-          <a:lstStyle/>
-          <a:p>
-            <a:pPr algn="ctr"/>
-            <a:r>
-              <a:rPr lang="en-SG" dirty="0"/>
-              <a:t>Submit / Deal Cards</a:t>
-            </a:r>
-          </a:p>
-        </p:txBody>
-      </p:sp>
-      <p:sp>
-        <p:nvSpPr>
-          <p:cNvPr id="10" name="Rectangle 9">
-            <a:extLst>
-              <a:ext uri="{FF2B5EF4-FFF2-40B4-BE49-F238E27FC236}">
-                <a16:creationId xmlns:a16="http://schemas.microsoft.com/office/drawing/2014/main" id="{B17EC8F2-07B2-4EE4-9CC7-FF69211D28EC}"/>
-              </a:ext>
-            </a:extLst>
-          </p:cNvPr>
-          <p:cNvSpPr/>
-          <p:nvPr/>
-        </p:nvSpPr>
-        <p:spPr>
-          <a:xfrm>
-            <a:off x="557784" y="5332930"/>
-            <a:ext cx="2374960" cy="465221"/>
-          </a:xfrm>
-          <a:prstGeom prst="rect">
-            <a:avLst/>
-          </a:prstGeom>
-        </p:spPr>
-        <p:style>
-          <a:lnRef idx="2">
-            <a:schemeClr val="accent1">
-              <a:shade val="50000"/>
-            </a:schemeClr>
-          </a:lnRef>
-          <a:fillRef idx="1">
-            <a:schemeClr val="accent1"/>
-          </a:fillRef>
-          <a:effectRef idx="0">
-            <a:schemeClr val="accent1"/>
-          </a:effectRef>
-          <a:fontRef idx="minor">
-            <a:schemeClr val="lt1"/>
-          </a:fontRef>
-        </p:style>
-        <p:txBody>
-          <a:bodyPr rtlCol="0" anchor="ctr"/>
-          <a:lstStyle/>
-          <a:p>
-            <a:pPr algn="ctr"/>
-            <a:r>
-              <a:rPr lang="en-SG" dirty="0"/>
-              <a:t>Credits Info</a:t>
-            </a:r>
-          </a:p>
-        </p:txBody>
-      </p:sp>
-      <p:sp>
-        <p:nvSpPr>
-          <p:cNvPr id="12" name="Rectangle 11">
-            <a:extLst>
-              <a:ext uri="{FF2B5EF4-FFF2-40B4-BE49-F238E27FC236}">
-                <a16:creationId xmlns:a16="http://schemas.microsoft.com/office/drawing/2014/main" id="{32BA0ABE-DC2A-4909-B292-647C8BB6D36F}"/>
-              </a:ext>
-            </a:extLst>
-          </p:cNvPr>
-          <p:cNvSpPr/>
-          <p:nvPr/>
-        </p:nvSpPr>
-        <p:spPr>
-          <a:xfrm>
-            <a:off x="557784" y="737937"/>
-            <a:ext cx="10666392" cy="660935"/>
-          </a:xfrm>
-          <a:prstGeom prst="rect">
-            <a:avLst/>
-          </a:prstGeom>
-          <a:noFill/>
+          <a:solidFill>
+            <a:schemeClr val="bg1"/>
+          </a:solidFill>
           <a:ln>
             <a:solidFill>
               <a:schemeClr val="tx1"/>
@@ -4127,12 +4501,73 @@
           <a:p>
             <a:pPr algn="ctr"/>
             <a:r>
-              <a:rPr lang="en-SG" sz="3200" dirty="0">
+              <a:rPr lang="en-SG" dirty="0">
                 <a:solidFill>
                   <a:sysClr val="windowText" lastClr="000000"/>
                 </a:solidFill>
               </a:rPr>
-              <a:t>Game Info!</a:t>
+              <a:t>Credits:</a:t>
+            </a:r>
+          </a:p>
+        </p:txBody>
+      </p:sp>
+      <p:sp>
+        <p:nvSpPr>
+          <p:cNvPr id="15" name="Rectangle 14">
+            <a:extLst>
+              <a:ext uri="{FF2B5EF4-FFF2-40B4-BE49-F238E27FC236}">
+                <a16:creationId xmlns:a16="http://schemas.microsoft.com/office/drawing/2014/main" id="{84012506-49D4-4414-A993-D41A1ED47524}"/>
+              </a:ext>
+            </a:extLst>
+          </p:cNvPr>
+          <p:cNvSpPr/>
+          <p:nvPr/>
+        </p:nvSpPr>
+        <p:spPr>
+          <a:xfrm>
+            <a:off x="2493165" y="5332924"/>
+            <a:ext cx="1699238" cy="465221"/>
+          </a:xfrm>
+          <a:prstGeom prst="rect">
+            <a:avLst/>
+          </a:prstGeom>
+          <a:solidFill>
+            <a:schemeClr val="bg1"/>
+          </a:solidFill>
+          <a:ln>
+            <a:solidFill>
+              <a:schemeClr val="tx1"/>
+            </a:solidFill>
+          </a:ln>
+        </p:spPr>
+        <p:style>
+          <a:lnRef idx="2">
+            <a:schemeClr val="accent1">
+              <a:shade val="50000"/>
+            </a:schemeClr>
+          </a:lnRef>
+          <a:fillRef idx="1">
+            <a:schemeClr val="accent1"/>
+          </a:fillRef>
+          <a:effectRef idx="0">
+            <a:schemeClr val="accent1"/>
+          </a:effectRef>
+          <a:fontRef idx="minor">
+            <a:schemeClr val="lt1"/>
+          </a:fontRef>
+        </p:style>
+        <p:txBody>
+          <a:bodyPr rtlCol="0" anchor="ctr"/>
+          <a:lstStyle/>
+          <a:p>
+            <a:pPr algn="ctr"/>
+            <a:r>
+              <a:rPr lang="en-SG" dirty="0">
+                <a:solidFill>
+                  <a:sysClr val="windowText" lastClr="000000"/>
+                </a:solidFill>
+              </a:rPr>
+              <a:t>Fancy box to show credits</a:t>
             </a:r>
           </a:p>
         </p:txBody>

</xml_diff>